<commit_message>
Adding design goals ppt
</commit_message>
<xml_diff>
--- a/PowerPoints/Valentino_Design_Goals_and_Calculations.pptx
+++ b/PowerPoints/Valentino_Design_Goals_and_Calculations.pptx
@@ -5,12 +5,15 @@
     <p:sldMasterId id="2147483672" r:id="rId1"/>
   </p:sldMasterIdLst>
   <p:notesMasterIdLst>
-    <p:notesMasterId r:id="rId5"/>
+    <p:notesMasterId r:id="rId8"/>
   </p:notesMasterIdLst>
   <p:sldIdLst>
     <p:sldId id="261" r:id="rId2"/>
     <p:sldId id="263" r:id="rId3"/>
-    <p:sldId id="264" r:id="rId4"/>
+    <p:sldId id="268" r:id="rId4"/>
+    <p:sldId id="265" r:id="rId5"/>
+    <p:sldId id="266" r:id="rId6"/>
+    <p:sldId id="267" r:id="rId7"/>
   </p:sldIdLst>
   <p:sldSz cx="9144000" cy="6858000" type="screen4x3"/>
   <p:notesSz cx="6858000" cy="9144000"/>
@@ -1846,20 +1849,13 @@
         <p:spPr/>
         <p:txBody>
           <a:bodyPr>
-            <a:normAutofit fontScale="90000"/>
+            <a:normAutofit/>
           </a:bodyPr>
           <a:lstStyle/>
           <a:p>
             <a:r>
               <a:rPr lang="en-US" dirty="0"/>
-              <a:t>Design Project Specifications goals</a:t>
-            </a:r>
-            <a:br>
-              <a:rPr lang="en-US" dirty="0"/>
-            </a:br>
-            <a:r>
-              <a:rPr lang="en-US" dirty="0"/>
-              <a:t>(1 slide)  </a:t>
+              <a:t>QPD 1022 Class F PA Design Goals</a:t>
             </a:r>
           </a:p>
         </p:txBody>
@@ -1880,14 +1876,14 @@
             <p:ph idx="1"/>
             <p:extLst>
               <p:ext uri="{D42A27DB-BD31-4B8C-83A1-F6EECF244321}">
-                <p14:modId xmlns:p14="http://schemas.microsoft.com/office/powerpoint/2010/main" val="1644321125"/>
+                <p14:modId xmlns:p14="http://schemas.microsoft.com/office/powerpoint/2010/main" val="27531030"/>
               </p:ext>
             </p:extLst>
           </p:nvPr>
         </p:nvGraphicFramePr>
         <p:xfrm>
-          <a:off x="457200" y="1600200"/>
-          <a:ext cx="8229600" cy="2225040"/>
+          <a:off x="457200" y="1600199"/>
+          <a:ext cx="8304028" cy="1695892"/>
         </p:xfrm>
         <a:graphic>
           <a:graphicData uri="http://schemas.openxmlformats.org/drawingml/2006/table">
@@ -1896,28 +1892,28 @@
                 <a:tableStyleId>{5C22544A-7EE6-4342-B048-85BDC9FD1C3A}</a:tableStyleId>
               </a:tblPr>
               <a:tblGrid>
-                <a:gridCol w="2057400">
+                <a:gridCol w="2076007">
                   <a:extLst>
                     <a:ext uri="{9D8B030D-6E8A-4147-A177-3AD203B41FA5}">
                       <a16:colId xmlns:a16="http://schemas.microsoft.com/office/drawing/2014/main" val="2946563150"/>
                     </a:ext>
                   </a:extLst>
                 </a:gridCol>
-                <a:gridCol w="2057400">
+                <a:gridCol w="2076007">
                   <a:extLst>
                     <a:ext uri="{9D8B030D-6E8A-4147-A177-3AD203B41FA5}">
                       <a16:colId xmlns:a16="http://schemas.microsoft.com/office/drawing/2014/main" val="210796990"/>
                     </a:ext>
                   </a:extLst>
                 </a:gridCol>
-                <a:gridCol w="2057400">
+                <a:gridCol w="2076007">
                   <a:extLst>
                     <a:ext uri="{9D8B030D-6E8A-4147-A177-3AD203B41FA5}">
                       <a16:colId xmlns:a16="http://schemas.microsoft.com/office/drawing/2014/main" val="3398175374"/>
                     </a:ext>
                   </a:extLst>
                 </a:gridCol>
-                <a:gridCol w="2057400">
+                <a:gridCol w="2076007">
                   <a:extLst>
                     <a:ext uri="{9D8B030D-6E8A-4147-A177-3AD203B41FA5}">
                       <a16:colId xmlns:a16="http://schemas.microsoft.com/office/drawing/2014/main" val="1168114485"/>
@@ -1925,7 +1921,7 @@
                   </a:extLst>
                 </a:gridCol>
               </a:tblGrid>
-              <a:tr h="370840">
+              <a:tr h="423973">
                 <a:tc>
                   <a:txBody>
                     <a:bodyPr/>
@@ -1984,7 +1980,7 @@
                   </a:ext>
                 </a:extLst>
               </a:tr>
-              <a:tr h="370840">
+              <a:tr h="423973">
                 <a:tc>
                   <a:txBody>
                     <a:bodyPr/>
@@ -2019,7 +2015,7 @@
                     <a:p>
                       <a:r>
                         <a:rPr lang="en-US" dirty="0"/>
-                        <a:t>40.4 dBm</a:t>
+                        <a:t>40 dBm</a:t>
                       </a:r>
                     </a:p>
                   </a:txBody>
@@ -2044,7 +2040,7 @@
                   </a:ext>
                 </a:extLst>
               </a:tr>
-              <a:tr h="370840">
+              <a:tr h="423973">
                 <a:tc>
                   <a:txBody>
                     <a:bodyPr/>
@@ -2078,7 +2074,7 @@
                     <a:p>
                       <a:r>
                         <a:rPr lang="en-US" dirty="0"/>
-                        <a:t>68.8</a:t>
+                        <a:t>66.1 %</a:t>
                       </a:r>
                     </a:p>
                   </a:txBody>
@@ -2103,7 +2099,7 @@
                   </a:ext>
                 </a:extLst>
               </a:tr>
-              <a:tr h="370840">
+              <a:tr h="423973">
                 <a:tc>
                   <a:txBody>
                     <a:bodyPr/>
@@ -2137,7 +2133,7 @@
                     <a:p>
                       <a:r>
                         <a:rPr lang="en-US" dirty="0"/>
-                        <a:t>41.4</a:t>
+                        <a:t>33.1 dB</a:t>
                       </a:r>
                     </a:p>
                   </a:txBody>
@@ -2148,7 +2144,10 @@
                     <a:bodyPr/>
                     <a:lstStyle/>
                     <a:p>
-                      <a:endParaRPr lang="en-US"/>
+                      <a:r>
+                        <a:rPr lang="en-US" dirty="0"/>
+                        <a:t>27 dB</a:t>
+                      </a:r>
                     </a:p>
                   </a:txBody>
                   <a:tcPr/>
@@ -2159,134 +2158,45 @@
                   </a:ext>
                 </a:extLst>
               </a:tr>
-              <a:tr h="370840">
-                <a:tc>
-                  <a:txBody>
-                    <a:bodyPr/>
-                    <a:lstStyle/>
-                    <a:p>
-                      <a:endParaRPr lang="en-US"/>
-                    </a:p>
-                  </a:txBody>
-                  <a:tcPr/>
-                </a:tc>
-                <a:tc>
-                  <a:txBody>
-                    <a:bodyPr/>
-                    <a:lstStyle/>
-                    <a:p>
-                      <a:endParaRPr lang="en-US"/>
-                    </a:p>
-                  </a:txBody>
-                  <a:tcPr/>
-                </a:tc>
-                <a:tc>
-                  <a:txBody>
-                    <a:bodyPr/>
-                    <a:lstStyle/>
-                    <a:p>
-                      <a:endParaRPr lang="en-US"/>
-                    </a:p>
-                  </a:txBody>
-                  <a:tcPr/>
-                </a:tc>
-                <a:tc>
-                  <a:txBody>
-                    <a:bodyPr/>
-                    <a:lstStyle/>
-                    <a:p>
-                      <a:endParaRPr lang="en-US"/>
-                    </a:p>
-                  </a:txBody>
-                  <a:tcPr/>
-                </a:tc>
-                <a:extLst>
-                  <a:ext uri="{0D108BD9-81ED-4DB2-BD59-A6C34878D82A}">
-                    <a16:rowId xmlns:a16="http://schemas.microsoft.com/office/drawing/2014/main" val="4044445639"/>
-                  </a:ext>
-                </a:extLst>
-              </a:tr>
-              <a:tr h="370840">
-                <a:tc>
-                  <a:txBody>
-                    <a:bodyPr/>
-                    <a:lstStyle/>
-                    <a:p>
-                      <a:endParaRPr lang="en-US" dirty="0"/>
-                    </a:p>
-                  </a:txBody>
-                  <a:tcPr/>
-                </a:tc>
-                <a:tc>
-                  <a:txBody>
-                    <a:bodyPr/>
-                    <a:lstStyle/>
-                    <a:p>
-                      <a:endParaRPr lang="en-US"/>
-                    </a:p>
-                  </a:txBody>
-                  <a:tcPr/>
-                </a:tc>
-                <a:tc>
-                  <a:txBody>
-                    <a:bodyPr/>
-                    <a:lstStyle/>
-                    <a:p>
-                      <a:endParaRPr lang="en-US" dirty="0"/>
-                    </a:p>
-                  </a:txBody>
-                  <a:tcPr/>
-                </a:tc>
-                <a:tc>
-                  <a:txBody>
-                    <a:bodyPr/>
-                    <a:lstStyle/>
-                    <a:p>
-                      <a:endParaRPr lang="en-US" dirty="0"/>
-                    </a:p>
-                  </a:txBody>
-                  <a:tcPr/>
-                </a:tc>
-                <a:extLst>
-                  <a:ext uri="{0D108BD9-81ED-4DB2-BD59-A6C34878D82A}">
-                    <a16:rowId xmlns:a16="http://schemas.microsoft.com/office/drawing/2014/main" val="1781614982"/>
-                  </a:ext>
-                </a:extLst>
-              </a:tr>
             </a:tbl>
           </a:graphicData>
         </a:graphic>
       </p:graphicFrame>
-      <p:pic>
-        <p:nvPicPr>
-          <p:cNvPr id="4" name="Picture 3">
+      <p:sp>
+        <p:nvSpPr>
+          <p:cNvPr id="6" name="TextBox 5">
             <a:extLst>
               <a:ext uri="{FF2B5EF4-FFF2-40B4-BE49-F238E27FC236}">
-                <a16:creationId xmlns:a16="http://schemas.microsoft.com/office/drawing/2014/main" id="{75DBEE98-1456-4262-ABC7-871519A6D91E}"/>
+                <a16:creationId xmlns:a16="http://schemas.microsoft.com/office/drawing/2014/main" id="{16BFA05F-20DA-4E54-9D3C-06B795D70681}"/>
               </a:ext>
             </a:extLst>
           </p:cNvPr>
-          <p:cNvPicPr>
-            <a:picLocks noChangeAspect="1"/>
-          </p:cNvPicPr>
+          <p:cNvSpPr txBox="1"/>
           <p:nvPr/>
-        </p:nvPicPr>
-        <p:blipFill>
-          <a:blip r:embed="rId2"/>
-          <a:stretch>
-            <a:fillRect/>
-          </a:stretch>
-        </p:blipFill>
+        </p:nvSpPr>
         <p:spPr>
           <a:xfrm>
-            <a:off x="3038475" y="4391025"/>
-            <a:ext cx="6105525" cy="2466975"/>
+            <a:off x="648586" y="3678865"/>
+            <a:ext cx="4581575" cy="369332"/>
           </a:xfrm>
           <a:prstGeom prst="rect">
             <a:avLst/>
           </a:prstGeom>
+          <a:noFill/>
         </p:spPr>
-      </p:pic>
+        <p:txBody>
+          <a:bodyPr wrap="none" rtlCol="0">
+            <a:spAutoFit/>
+          </a:bodyPr>
+          <a:lstStyle/>
+          <a:p>
+            <a:r>
+              <a:rPr lang="en-US" dirty="0"/>
+              <a:t>Efficiency: 10% less than theoretical maximum</a:t>
+            </a:r>
+          </a:p>
+        </p:txBody>
+      </p:sp>
     </p:spTree>
     <p:extLst>
       <p:ext uri="{BB962C8B-B14F-4D97-AF65-F5344CB8AC3E}">
@@ -2322,7 +2232,7 @@
           <p:cNvPr id="2" name="Title 1">
             <a:extLst>
               <a:ext uri="{FF2B5EF4-FFF2-40B4-BE49-F238E27FC236}">
-                <a16:creationId xmlns:a16="http://schemas.microsoft.com/office/drawing/2014/main" id="{B45BA104-A7EA-4D37-81E4-897CFF84ACDE}"/>
+                <a16:creationId xmlns:a16="http://schemas.microsoft.com/office/drawing/2014/main" id="{FA8D4850-47C3-46AF-B63B-B277C0EE83BA}"/>
               </a:ext>
             </a:extLst>
           </p:cNvPr>
@@ -2335,21 +2245,12 @@
         </p:nvSpPr>
         <p:spPr/>
         <p:txBody>
-          <a:bodyPr>
-            <a:normAutofit fontScale="90000"/>
-          </a:bodyPr>
+          <a:bodyPr/>
           <a:lstStyle/>
           <a:p>
             <a:r>
               <a:rPr lang="en-US" dirty="0"/>
-              <a:t>Calculations</a:t>
-            </a:r>
-            <a:br>
-              <a:rPr lang="en-US" dirty="0"/>
-            </a:br>
-            <a:r>
-              <a:rPr lang="en-US" dirty="0"/>
-              <a:t>(3-5 slides) </a:t>
+              <a:t>How Goals were arrived at</a:t>
             </a:r>
           </a:p>
         </p:txBody>
@@ -2359,7 +2260,7 @@
           <p:cNvPr id="3" name="Content Placeholder 2">
             <a:extLst>
               <a:ext uri="{FF2B5EF4-FFF2-40B4-BE49-F238E27FC236}">
-                <a16:creationId xmlns:a16="http://schemas.microsoft.com/office/drawing/2014/main" id="{BDF3E5A7-4C7E-42E6-A705-145BE4F35CFE}"/>
+                <a16:creationId xmlns:a16="http://schemas.microsoft.com/office/drawing/2014/main" id="{8A880890-0236-477A-98A9-54FAD85CD033}"/>
               </a:ext>
             </a:extLst>
           </p:cNvPr>
@@ -2373,68 +2274,46 @@
         <p:spPr/>
         <p:txBody>
           <a:bodyPr>
-            <a:normAutofit fontScale="70000" lnSpcReduction="20000"/>
+            <a:normAutofit fontScale="92500" lnSpcReduction="20000"/>
           </a:bodyPr>
           <a:lstStyle/>
           <a:p>
             <a:r>
-              <a:rPr lang="en-US" i="1" dirty="0"/>
-              <a:t>Paste in your calculations using whatever combination of ADS , hand calculations, or computer-assisted approximate calculations, make sure you show the steps and equations you used as well as summarize your approximate design results for: </a:t>
-            </a:r>
-          </a:p>
-          <a:p>
-            <a:endParaRPr lang="en-US" i="1" dirty="0"/>
-          </a:p>
-          <a:p>
-            <a:pPr marL="914400" lvl="1" indent="-514350">
-              <a:buFont typeface="+mj-lt"/>
-              <a:buAutoNum type="alphaLcPeriod"/>
-            </a:pPr>
-            <a:r>
               <a:rPr lang="en-US" dirty="0"/>
-              <a:t>the optimal load resistance (intrinsic plane) for maximum Class B power</a:t>
-            </a:r>
-          </a:p>
-          <a:p>
-            <a:pPr marL="914400" lvl="1" indent="-514350">
-              <a:buFont typeface="+mj-lt"/>
-              <a:buAutoNum type="alphaLcPeriod"/>
-            </a:pPr>
-            <a:r>
+              <a:t>Efficiency: 10% less than theoretical max as described in Class F supplemental paper using 5 reflected harmonics</a:t>
+            </a:r>
+            <a:br>
               <a:rPr lang="en-US" dirty="0"/>
-              <a:t>the maximum linear and saturated power capability of the device assuming the supply voltage specified in your assignment.   </a:t>
-            </a:r>
-          </a:p>
-          <a:p>
-            <a:pPr marL="914400" lvl="1" indent="-514350">
-              <a:buFont typeface="+mj-lt"/>
-              <a:buAutoNum type="alphaLcPeriod"/>
-            </a:pPr>
-            <a:r>
+            </a:br>
+            <a:br>
               <a:rPr lang="en-US" dirty="0"/>
-              <a:t>Fit an RLC model to S22 of the device model and estimate the complex load impedance/reflection coefficient that would maximize power at your design frequency and plot this on a Smith chart.  </a:t>
-            </a:r>
-          </a:p>
-          <a:p>
-            <a:pPr marL="914400" lvl="1" indent="-514350">
-              <a:buFont typeface="+mj-lt"/>
-              <a:buAutoNum type="alphaLcPeriod"/>
-            </a:pPr>
-            <a:r>
+            </a:br>
+            <a:br>
               <a:rPr lang="en-US" dirty="0"/>
-              <a:t>Plot the 2dB “Cripps” load-pull contours on a 50 ohm chart at the intrinsic and extrinsic reference planes. </a:t>
-            </a:r>
-          </a:p>
-          <a:p>
-            <a:pPr marL="914400" lvl="1" indent="-514350">
-              <a:buFont typeface="+mj-lt"/>
-              <a:buAutoNum type="alphaLcPeriod"/>
-            </a:pPr>
+            </a:br>
             <a:r>
               <a:rPr lang="en-US" dirty="0"/>
-              <a:t>Include your calculations into your PPT  from Step A1. </a:t>
-            </a:r>
-            <a:endParaRPr lang="en-US" i="1" dirty="0"/>
+              <a:t> </a:t>
+            </a:r>
+            <a:br>
+              <a:rPr lang="en-US" dirty="0"/>
+            </a:br>
+            <a:endParaRPr lang="en-US" dirty="0"/>
+          </a:p>
+          <a:p>
+            <a:r>
+              <a:rPr lang="en-US" dirty="0"/>
+              <a:t>Gain: Max gain – 6dB as shown in the “cheat sheet” given in the class notes for Module 1</a:t>
+            </a:r>
+          </a:p>
+          <a:p>
+            <a:r>
+              <a:rPr lang="en-US" dirty="0"/>
+              <a:t>Power: Power shown at maximum efficiency match – 2dB</a:t>
+            </a:r>
+          </a:p>
+          <a:p>
+            <a:endParaRPr lang="en-US" dirty="0"/>
           </a:p>
         </p:txBody>
       </p:sp>
@@ -2443,7 +2322,7 @@
           <p:cNvPr id="4" name="Slide Number Placeholder 3">
             <a:extLst>
               <a:ext uri="{FF2B5EF4-FFF2-40B4-BE49-F238E27FC236}">
-                <a16:creationId xmlns:a16="http://schemas.microsoft.com/office/drawing/2014/main" id="{B4633558-2DB1-48D9-BBD5-90C2D3EE4E20}"/>
+                <a16:creationId xmlns:a16="http://schemas.microsoft.com/office/drawing/2014/main" id="{7DDE3F64-957D-4FEE-84AE-DA076FAE0E65}"/>
               </a:ext>
             </a:extLst>
           </p:cNvPr>
@@ -2467,10 +2346,1274 @@
           </a:p>
         </p:txBody>
       </p:sp>
+      <p:pic>
+        <p:nvPicPr>
+          <p:cNvPr id="5" name="Picture 4">
+            <a:extLst>
+              <a:ext uri="{FF2B5EF4-FFF2-40B4-BE49-F238E27FC236}">
+                <a16:creationId xmlns:a16="http://schemas.microsoft.com/office/drawing/2014/main" id="{0BE31BFC-B93C-443B-A4E1-F2B671C425F8}"/>
+              </a:ext>
+            </a:extLst>
+          </p:cNvPr>
+          <p:cNvPicPr>
+            <a:picLocks noChangeAspect="1"/>
+          </p:cNvPicPr>
+          <p:nvPr/>
+        </p:nvPicPr>
+        <p:blipFill>
+          <a:blip r:embed="rId2"/>
+          <a:stretch>
+            <a:fillRect/>
+          </a:stretch>
+        </p:blipFill>
+        <p:spPr>
+          <a:xfrm>
+            <a:off x="4572000" y="2476238"/>
+            <a:ext cx="3937148" cy="1599022"/>
+          </a:xfrm>
+          <a:prstGeom prst="rect">
+            <a:avLst/>
+          </a:prstGeom>
+        </p:spPr>
+      </p:pic>
     </p:spTree>
     <p:extLst>
       <p:ext uri="{BB962C8B-B14F-4D97-AF65-F5344CB8AC3E}">
-        <p14:creationId xmlns:p14="http://schemas.microsoft.com/office/powerpoint/2010/main" val="3140666231"/>
+        <p14:creationId xmlns:p14="http://schemas.microsoft.com/office/powerpoint/2010/main" val="36346843"/>
+      </p:ext>
+    </p:extLst>
+  </p:cSld>
+  <p:clrMapOvr>
+    <a:masterClrMapping/>
+  </p:clrMapOvr>
+</p:sld>
+</file>
+
+<file path=ppt/slides/slide4.xml><?xml version="1.0" encoding="utf-8"?>
+<p:sld xmlns:a="http://schemas.openxmlformats.org/drawingml/2006/main" xmlns:r="http://schemas.openxmlformats.org/officeDocument/2006/relationships" xmlns:p="http://schemas.openxmlformats.org/presentationml/2006/main">
+  <p:cSld>
+    <p:spTree>
+      <p:nvGrpSpPr>
+        <p:cNvPr id="1" name=""/>
+        <p:cNvGrpSpPr/>
+        <p:nvPr/>
+      </p:nvGrpSpPr>
+      <p:grpSpPr>
+        <a:xfrm>
+          <a:off x="0" y="0"/>
+          <a:ext cx="0" cy="0"/>
+          <a:chOff x="0" y="0"/>
+          <a:chExt cx="0" cy="0"/>
+        </a:xfrm>
+      </p:grpSpPr>
+      <p:sp>
+        <p:nvSpPr>
+          <p:cNvPr id="2" name="Title 1">
+            <a:extLst>
+              <a:ext uri="{FF2B5EF4-FFF2-40B4-BE49-F238E27FC236}">
+                <a16:creationId xmlns:a16="http://schemas.microsoft.com/office/drawing/2014/main" id="{9F0FA9E2-41DC-42C2-8B55-396610F35C50}"/>
+              </a:ext>
+            </a:extLst>
+          </p:cNvPr>
+          <p:cNvSpPr>
+            <a:spLocks noGrp="1"/>
+          </p:cNvSpPr>
+          <p:nvPr>
+            <p:ph type="title"/>
+          </p:nvPr>
+        </p:nvSpPr>
+        <p:spPr/>
+        <p:txBody>
+          <a:bodyPr/>
+          <a:lstStyle/>
+          <a:p>
+            <a:r>
+              <a:rPr lang="en-US" dirty="0"/>
+              <a:t>IV Characteristics</a:t>
+            </a:r>
+          </a:p>
+        </p:txBody>
+      </p:sp>
+      <p:sp>
+        <p:nvSpPr>
+          <p:cNvPr id="4" name="Slide Number Placeholder 3">
+            <a:extLst>
+              <a:ext uri="{FF2B5EF4-FFF2-40B4-BE49-F238E27FC236}">
+                <a16:creationId xmlns:a16="http://schemas.microsoft.com/office/drawing/2014/main" id="{D144055F-E4AB-4A52-BEC1-D3776FEB6F51}"/>
+              </a:ext>
+            </a:extLst>
+          </p:cNvPr>
+          <p:cNvSpPr>
+            <a:spLocks noGrp="1"/>
+          </p:cNvSpPr>
+          <p:nvPr>
+            <p:ph type="sldNum" sz="quarter" idx="12"/>
+          </p:nvPr>
+        </p:nvSpPr>
+        <p:spPr/>
+        <p:txBody>
+          <a:bodyPr/>
+          <a:lstStyle/>
+          <a:p>
+            <a:fld id="{395A37A8-5642-4265-A9E6-C78259D0B141}" type="slidenum">
+              <a:rPr lang="en-US" smtClean="0"/>
+              <a:t>4</a:t>
+            </a:fld>
+            <a:endParaRPr lang="en-US"/>
+          </a:p>
+        </p:txBody>
+      </p:sp>
+      <p:pic>
+        <p:nvPicPr>
+          <p:cNvPr id="8" name="Picture 7">
+            <a:extLst>
+              <a:ext uri="{FF2B5EF4-FFF2-40B4-BE49-F238E27FC236}">
+                <a16:creationId xmlns:a16="http://schemas.microsoft.com/office/drawing/2014/main" id="{19B4FF75-18B1-4403-850E-DAAEC77D6E3F}"/>
+              </a:ext>
+            </a:extLst>
+          </p:cNvPr>
+          <p:cNvPicPr>
+            <a:picLocks noChangeAspect="1"/>
+          </p:cNvPicPr>
+          <p:nvPr/>
+        </p:nvPicPr>
+        <p:blipFill>
+          <a:blip r:embed="rId2" cstate="print">
+            <a:extLst>
+              <a:ext uri="{28A0092B-C50C-407E-A947-70E740481C1C}">
+                <a14:useLocalDpi xmlns:a14="http://schemas.microsoft.com/office/drawing/2010/main" val="0"/>
+              </a:ext>
+            </a:extLst>
+          </a:blip>
+          <a:stretch>
+            <a:fillRect/>
+          </a:stretch>
+        </p:blipFill>
+        <p:spPr>
+          <a:xfrm>
+            <a:off x="3844952" y="4229946"/>
+            <a:ext cx="5293387" cy="2519915"/>
+          </a:xfrm>
+          <a:prstGeom prst="rect">
+            <a:avLst/>
+          </a:prstGeom>
+        </p:spPr>
+      </p:pic>
+      <p:sp>
+        <p:nvSpPr>
+          <p:cNvPr id="15" name="Content Placeholder 2">
+            <a:extLst>
+              <a:ext uri="{FF2B5EF4-FFF2-40B4-BE49-F238E27FC236}">
+                <a16:creationId xmlns:a16="http://schemas.microsoft.com/office/drawing/2014/main" id="{3522AA5A-ADD5-4868-8D4A-2165813CF2FF}"/>
+              </a:ext>
+            </a:extLst>
+          </p:cNvPr>
+          <p:cNvSpPr txBox="1">
+            <a:spLocks/>
+          </p:cNvSpPr>
+          <p:nvPr/>
+        </p:nvSpPr>
+        <p:spPr>
+          <a:xfrm>
+            <a:off x="70393" y="1277677"/>
+            <a:ext cx="3839290" cy="5472184"/>
+          </a:xfrm>
+          <a:prstGeom prst="rect">
+            <a:avLst/>
+          </a:prstGeom>
+        </p:spPr>
+        <p:txBody>
+          <a:bodyPr vert="horz" lIns="91440" tIns="45720" rIns="91440" bIns="45720" rtlCol="0">
+            <a:normAutofit/>
+          </a:bodyPr>
+          <a:lstStyle>
+            <a:lvl1pPr marL="342900" indent="-342900" algn="l" defTabSz="914400" rtl="0" eaLnBrk="1" latinLnBrk="0" hangingPunct="1">
+              <a:spcBef>
+                <a:spcPct val="20000"/>
+              </a:spcBef>
+              <a:buFont typeface="Arial" pitchFamily="34" charset="0"/>
+              <a:buChar char="•"/>
+              <a:defRPr sz="3200" kern="1200">
+                <a:solidFill>
+                  <a:schemeClr val="tx1"/>
+                </a:solidFill>
+                <a:latin typeface="+mn-lt"/>
+                <a:ea typeface="+mn-ea"/>
+                <a:cs typeface="+mn-cs"/>
+              </a:defRPr>
+            </a:lvl1pPr>
+            <a:lvl2pPr marL="742950" indent="-285750" algn="l" defTabSz="914400" rtl="0" eaLnBrk="1" latinLnBrk="0" hangingPunct="1">
+              <a:spcBef>
+                <a:spcPct val="20000"/>
+              </a:spcBef>
+              <a:buFont typeface="Arial" pitchFamily="34" charset="0"/>
+              <a:buChar char="–"/>
+              <a:defRPr sz="2800" kern="1200">
+                <a:solidFill>
+                  <a:schemeClr val="tx1"/>
+                </a:solidFill>
+                <a:latin typeface="+mn-lt"/>
+                <a:ea typeface="+mn-ea"/>
+                <a:cs typeface="+mn-cs"/>
+              </a:defRPr>
+            </a:lvl2pPr>
+            <a:lvl3pPr marL="1143000" indent="-228600" algn="l" defTabSz="914400" rtl="0" eaLnBrk="1" latinLnBrk="0" hangingPunct="1">
+              <a:spcBef>
+                <a:spcPct val="20000"/>
+              </a:spcBef>
+              <a:buFont typeface="Arial" pitchFamily="34" charset="0"/>
+              <a:buChar char="•"/>
+              <a:defRPr sz="2400" kern="1200">
+                <a:solidFill>
+                  <a:schemeClr val="tx1"/>
+                </a:solidFill>
+                <a:latin typeface="+mn-lt"/>
+                <a:ea typeface="+mn-ea"/>
+                <a:cs typeface="+mn-cs"/>
+              </a:defRPr>
+            </a:lvl3pPr>
+            <a:lvl4pPr marL="1600200" indent="-228600" algn="l" defTabSz="914400" rtl="0" eaLnBrk="1" latinLnBrk="0" hangingPunct="1">
+              <a:spcBef>
+                <a:spcPct val="20000"/>
+              </a:spcBef>
+              <a:buFont typeface="Arial" pitchFamily="34" charset="0"/>
+              <a:buChar char="–"/>
+              <a:defRPr sz="2000" kern="1200">
+                <a:solidFill>
+                  <a:schemeClr val="tx1"/>
+                </a:solidFill>
+                <a:latin typeface="+mn-lt"/>
+                <a:ea typeface="+mn-ea"/>
+                <a:cs typeface="+mn-cs"/>
+              </a:defRPr>
+            </a:lvl4pPr>
+            <a:lvl5pPr marL="2057400" indent="-228600" algn="l" defTabSz="914400" rtl="0" eaLnBrk="1" latinLnBrk="0" hangingPunct="1">
+              <a:spcBef>
+                <a:spcPct val="20000"/>
+              </a:spcBef>
+              <a:buFont typeface="Arial" pitchFamily="34" charset="0"/>
+              <a:buChar char="»"/>
+              <a:defRPr sz="2000" kern="1200">
+                <a:solidFill>
+                  <a:schemeClr val="tx1"/>
+                </a:solidFill>
+                <a:latin typeface="+mn-lt"/>
+                <a:ea typeface="+mn-ea"/>
+                <a:cs typeface="+mn-cs"/>
+              </a:defRPr>
+            </a:lvl5pPr>
+            <a:lvl6pPr marL="2514600" indent="-228600" algn="l" defTabSz="914400" rtl="0" eaLnBrk="1" latinLnBrk="0" hangingPunct="1">
+              <a:spcBef>
+                <a:spcPct val="20000"/>
+              </a:spcBef>
+              <a:buFont typeface="Arial" pitchFamily="34" charset="0"/>
+              <a:buChar char="•"/>
+              <a:defRPr sz="2000" kern="1200">
+                <a:solidFill>
+                  <a:schemeClr val="tx1"/>
+                </a:solidFill>
+                <a:latin typeface="+mn-lt"/>
+                <a:ea typeface="+mn-ea"/>
+                <a:cs typeface="+mn-cs"/>
+              </a:defRPr>
+            </a:lvl6pPr>
+            <a:lvl7pPr marL="2971800" indent="-228600" algn="l" defTabSz="914400" rtl="0" eaLnBrk="1" latinLnBrk="0" hangingPunct="1">
+              <a:spcBef>
+                <a:spcPct val="20000"/>
+              </a:spcBef>
+              <a:buFont typeface="Arial" pitchFamily="34" charset="0"/>
+              <a:buChar char="•"/>
+              <a:defRPr sz="2000" kern="1200">
+                <a:solidFill>
+                  <a:schemeClr val="tx1"/>
+                </a:solidFill>
+                <a:latin typeface="+mn-lt"/>
+                <a:ea typeface="+mn-ea"/>
+                <a:cs typeface="+mn-cs"/>
+              </a:defRPr>
+            </a:lvl7pPr>
+            <a:lvl8pPr marL="3429000" indent="-228600" algn="l" defTabSz="914400" rtl="0" eaLnBrk="1" latinLnBrk="0" hangingPunct="1">
+              <a:spcBef>
+                <a:spcPct val="20000"/>
+              </a:spcBef>
+              <a:buFont typeface="Arial" pitchFamily="34" charset="0"/>
+              <a:buChar char="•"/>
+              <a:defRPr sz="2000" kern="1200">
+                <a:solidFill>
+                  <a:schemeClr val="tx1"/>
+                </a:solidFill>
+                <a:latin typeface="+mn-lt"/>
+                <a:ea typeface="+mn-ea"/>
+                <a:cs typeface="+mn-cs"/>
+              </a:defRPr>
+            </a:lvl8pPr>
+            <a:lvl9pPr marL="3886200" indent="-228600" algn="l" defTabSz="914400" rtl="0" eaLnBrk="1" latinLnBrk="0" hangingPunct="1">
+              <a:spcBef>
+                <a:spcPct val="20000"/>
+              </a:spcBef>
+              <a:buFont typeface="Arial" pitchFamily="34" charset="0"/>
+              <a:buChar char="•"/>
+              <a:defRPr sz="2000" kern="1200">
+                <a:solidFill>
+                  <a:schemeClr val="tx1"/>
+                </a:solidFill>
+                <a:latin typeface="+mn-lt"/>
+                <a:ea typeface="+mn-ea"/>
+                <a:cs typeface="+mn-cs"/>
+              </a:defRPr>
+            </a:lvl9pPr>
+          </a:lstStyle>
+          <a:p>
+            <a:r>
+              <a:rPr lang="en-US" sz="2000" dirty="0"/>
+              <a:t> Optimum Load Resistance</a:t>
+            </a:r>
+          </a:p>
+          <a:p>
+            <a:pPr lvl="1"/>
+            <a:r>
+              <a:rPr lang="en-US" sz="1600" dirty="0"/>
+              <a:t>Given that our bias point is 32 V max, and our knee voltage is 5 V, that means that our maximum peak to peak drain voltage for class B is:</a:t>
+            </a:r>
+            <a:br>
+              <a:rPr lang="en-US" sz="1600" dirty="0"/>
+            </a:br>
+            <a:r>
+              <a:rPr lang="en-US" sz="1600" dirty="0"/>
+              <a:t>((32-5)+ 32) - 5 = 54 V. </a:t>
+            </a:r>
+            <a:br>
+              <a:rPr lang="en-US" sz="1600" dirty="0"/>
+            </a:br>
+            <a:br>
+              <a:rPr lang="en-US" sz="1600" dirty="0"/>
+            </a:br>
+            <a:endParaRPr lang="en-US" sz="1600" dirty="0"/>
+          </a:p>
+          <a:p>
+            <a:r>
+              <a:rPr lang="en-US" sz="2000" dirty="0" err="1"/>
+              <a:t>P_lin</a:t>
+            </a:r>
+            <a:r>
+              <a:rPr lang="en-US" sz="2000" dirty="0"/>
+              <a:t> and </a:t>
+            </a:r>
+            <a:r>
+              <a:rPr lang="en-US" sz="2000" dirty="0" err="1"/>
+              <a:t>P_sat</a:t>
+            </a:r>
+            <a:r>
+              <a:rPr lang="en-US" sz="2000" dirty="0"/>
+              <a:t>:</a:t>
+            </a:r>
+          </a:p>
+          <a:p>
+            <a:pPr lvl="1"/>
+            <a:br>
+              <a:rPr lang="en-US" sz="1600" u="sng" dirty="0"/>
+            </a:br>
+            <a:br>
+              <a:rPr lang="en-US" sz="1600" u="sng" dirty="0"/>
+            </a:br>
+            <a:br>
+              <a:rPr lang="en-US" sz="1600" u="sng" dirty="0"/>
+            </a:br>
+            <a:r>
+              <a:rPr lang="en-US" sz="1600" dirty="0"/>
+              <a:t>Estimated in same manner as HW4</a:t>
+            </a:r>
+            <a:endParaRPr lang="en-US" sz="1600" u="sng" dirty="0"/>
+          </a:p>
+          <a:p>
+            <a:pPr lvl="1"/>
+            <a:endParaRPr lang="en-US" sz="1600" i="1" dirty="0"/>
+          </a:p>
+        </p:txBody>
+      </p:sp>
+      <p:pic>
+        <p:nvPicPr>
+          <p:cNvPr id="17" name="Picture 16">
+            <a:extLst>
+              <a:ext uri="{FF2B5EF4-FFF2-40B4-BE49-F238E27FC236}">
+                <a16:creationId xmlns:a16="http://schemas.microsoft.com/office/drawing/2014/main" id="{DB84484B-61B2-494C-ADCE-3772CBE53B01}"/>
+              </a:ext>
+            </a:extLst>
+          </p:cNvPr>
+          <p:cNvPicPr>
+            <a:picLocks noChangeAspect="1"/>
+          </p:cNvPicPr>
+          <p:nvPr/>
+        </p:nvPicPr>
+        <p:blipFill>
+          <a:blip r:embed="rId3" cstate="print">
+            <a:extLst>
+              <a:ext uri="{28A0092B-C50C-407E-A947-70E740481C1C}">
+                <a14:useLocalDpi xmlns:a14="http://schemas.microsoft.com/office/drawing/2010/main" val="0"/>
+              </a:ext>
+            </a:extLst>
+          </a:blip>
+          <a:stretch>
+            <a:fillRect/>
+          </a:stretch>
+        </p:blipFill>
+        <p:spPr>
+          <a:xfrm>
+            <a:off x="3844951" y="1551005"/>
+            <a:ext cx="5293388" cy="2586409"/>
+          </a:xfrm>
+          <a:prstGeom prst="rect">
+            <a:avLst/>
+          </a:prstGeom>
+        </p:spPr>
+      </p:pic>
+      <p:pic>
+        <p:nvPicPr>
+          <p:cNvPr id="1032" name="Picture 8" descr="https://quicklatex.com/cache3/c3/ql_0cab88528baa4316a4e583d74bb5e7c3_l3.png">
+            <a:extLst>
+              <a:ext uri="{FF2B5EF4-FFF2-40B4-BE49-F238E27FC236}">
+                <a16:creationId xmlns:a16="http://schemas.microsoft.com/office/drawing/2014/main" id="{FD956604-5CFC-4A13-A1E8-078CA4A3164B}"/>
+              </a:ext>
+            </a:extLst>
+          </p:cNvPr>
+          <p:cNvPicPr>
+            <a:picLocks noChangeAspect="1" noChangeArrowheads="1"/>
+          </p:cNvPicPr>
+          <p:nvPr/>
+        </p:nvPicPr>
+        <p:blipFill>
+          <a:blip r:embed="rId4">
+            <a:extLst>
+              <a:ext uri="{28A0092B-C50C-407E-A947-70E740481C1C}">
+                <a14:useLocalDpi xmlns:a14="http://schemas.microsoft.com/office/drawing/2010/main" val="0"/>
+              </a:ext>
+            </a:extLst>
+          </a:blip>
+          <a:srcRect/>
+          <a:stretch>
+            <a:fillRect/>
+          </a:stretch>
+        </p:blipFill>
+        <p:spPr bwMode="auto">
+          <a:xfrm>
+            <a:off x="985617" y="3243262"/>
+            <a:ext cx="2047875" cy="371475"/>
+          </a:xfrm>
+          <a:prstGeom prst="rect">
+            <a:avLst/>
+          </a:prstGeom>
+          <a:noFill/>
+          <a:extLst>
+            <a:ext uri="{909E8E84-426E-40DD-AFC4-6F175D3DCCD1}">
+              <a14:hiddenFill xmlns:a14="http://schemas.microsoft.com/office/drawing/2010/main">
+                <a:solidFill>
+                  <a:srgbClr val="FFFFFF"/>
+                </a:solidFill>
+              </a14:hiddenFill>
+            </a:ext>
+          </a:extLst>
+        </p:spPr>
+      </p:pic>
+      <p:pic>
+        <p:nvPicPr>
+          <p:cNvPr id="22" name="Picture 21">
+            <a:extLst>
+              <a:ext uri="{FF2B5EF4-FFF2-40B4-BE49-F238E27FC236}">
+                <a16:creationId xmlns:a16="http://schemas.microsoft.com/office/drawing/2014/main" id="{E00C347B-D794-4640-9329-70023B9984CF}"/>
+              </a:ext>
+            </a:extLst>
+          </p:cNvPr>
+          <p:cNvPicPr>
+            <a:picLocks noChangeAspect="1"/>
+          </p:cNvPicPr>
+          <p:nvPr/>
+        </p:nvPicPr>
+        <p:blipFill>
+          <a:blip r:embed="rId5"/>
+          <a:stretch>
+            <a:fillRect/>
+          </a:stretch>
+        </p:blipFill>
+        <p:spPr>
+          <a:xfrm>
+            <a:off x="846396" y="3997328"/>
+            <a:ext cx="1736540" cy="243337"/>
+          </a:xfrm>
+          <a:prstGeom prst="rect">
+            <a:avLst/>
+          </a:prstGeom>
+        </p:spPr>
+      </p:pic>
+      <p:pic>
+        <p:nvPicPr>
+          <p:cNvPr id="23" name="Picture 22">
+            <a:extLst>
+              <a:ext uri="{FF2B5EF4-FFF2-40B4-BE49-F238E27FC236}">
+                <a16:creationId xmlns:a16="http://schemas.microsoft.com/office/drawing/2014/main" id="{14DB2297-C31B-4AED-88E4-D8EEE0FDCDCF}"/>
+              </a:ext>
+            </a:extLst>
+          </p:cNvPr>
+          <p:cNvPicPr>
+            <a:picLocks noChangeAspect="1"/>
+          </p:cNvPicPr>
+          <p:nvPr/>
+        </p:nvPicPr>
+        <p:blipFill>
+          <a:blip r:embed="rId6"/>
+          <a:stretch>
+            <a:fillRect/>
+          </a:stretch>
+        </p:blipFill>
+        <p:spPr>
+          <a:xfrm>
+            <a:off x="453059" y="5021999"/>
+            <a:ext cx="2940354" cy="1839431"/>
+          </a:xfrm>
+          <a:prstGeom prst="rect">
+            <a:avLst/>
+          </a:prstGeom>
+        </p:spPr>
+      </p:pic>
+      <p:pic>
+        <p:nvPicPr>
+          <p:cNvPr id="1036" name="Picture 12" descr="https://quicklatex.com/cache3/a0/ql_aed4df0010b93f9d96873573bb8cd9a0_l3.png">
+            <a:extLst>
+              <a:ext uri="{FF2B5EF4-FFF2-40B4-BE49-F238E27FC236}">
+                <a16:creationId xmlns:a16="http://schemas.microsoft.com/office/drawing/2014/main" id="{85275F66-FB81-44AB-A338-D0EB0B1C6F97}"/>
+              </a:ext>
+            </a:extLst>
+          </p:cNvPr>
+          <p:cNvPicPr>
+            <a:picLocks noChangeAspect="1" noChangeArrowheads="1"/>
+          </p:cNvPicPr>
+          <p:nvPr/>
+        </p:nvPicPr>
+        <p:blipFill>
+          <a:blip r:embed="rId7">
+            <a:extLst>
+              <a:ext uri="{28A0092B-C50C-407E-A947-70E740481C1C}">
+                <a14:useLocalDpi xmlns:a14="http://schemas.microsoft.com/office/drawing/2010/main" val="0"/>
+              </a:ext>
+            </a:extLst>
+          </a:blip>
+          <a:srcRect/>
+          <a:stretch>
+            <a:fillRect/>
+          </a:stretch>
+        </p:blipFill>
+        <p:spPr bwMode="auto">
+          <a:xfrm>
+            <a:off x="1817946" y="4492280"/>
+            <a:ext cx="1390650" cy="219075"/>
+          </a:xfrm>
+          <a:prstGeom prst="rect">
+            <a:avLst/>
+          </a:prstGeom>
+          <a:noFill/>
+          <a:extLst>
+            <a:ext uri="{909E8E84-426E-40DD-AFC4-6F175D3DCCD1}">
+              <a14:hiddenFill xmlns:a14="http://schemas.microsoft.com/office/drawing/2010/main">
+                <a:solidFill>
+                  <a:srgbClr val="FFFFFF"/>
+                </a:solidFill>
+              </a14:hiddenFill>
+            </a:ext>
+          </a:extLst>
+        </p:spPr>
+      </p:pic>
+      <p:pic>
+        <p:nvPicPr>
+          <p:cNvPr id="1038" name="Picture 14" descr="https://quicklatex.com/cache3/fa/ql_decb6750f56f4a8cd31734366b2333fa_l3.png">
+            <a:extLst>
+              <a:ext uri="{FF2B5EF4-FFF2-40B4-BE49-F238E27FC236}">
+                <a16:creationId xmlns:a16="http://schemas.microsoft.com/office/drawing/2014/main" id="{9DAC222E-E24C-490F-A195-910C6C004A40}"/>
+              </a:ext>
+            </a:extLst>
+          </p:cNvPr>
+          <p:cNvPicPr>
+            <a:picLocks noChangeAspect="1" noChangeArrowheads="1"/>
+          </p:cNvPicPr>
+          <p:nvPr/>
+        </p:nvPicPr>
+        <p:blipFill>
+          <a:blip r:embed="rId8">
+            <a:extLst>
+              <a:ext uri="{28A0092B-C50C-407E-A947-70E740481C1C}">
+                <a14:useLocalDpi xmlns:a14="http://schemas.microsoft.com/office/drawing/2010/main" val="0"/>
+              </a:ext>
+            </a:extLst>
+          </a:blip>
+          <a:srcRect/>
+          <a:stretch>
+            <a:fillRect/>
+          </a:stretch>
+        </p:blipFill>
+        <p:spPr bwMode="auto">
+          <a:xfrm>
+            <a:off x="846396" y="4230553"/>
+            <a:ext cx="2362200" cy="219075"/>
+          </a:xfrm>
+          <a:prstGeom prst="rect">
+            <a:avLst/>
+          </a:prstGeom>
+          <a:noFill/>
+          <a:extLst>
+            <a:ext uri="{909E8E84-426E-40DD-AFC4-6F175D3DCCD1}">
+              <a14:hiddenFill xmlns:a14="http://schemas.microsoft.com/office/drawing/2010/main">
+                <a:solidFill>
+                  <a:srgbClr val="FFFFFF"/>
+                </a:solidFill>
+              </a14:hiddenFill>
+            </a:ext>
+          </a:extLst>
+        </p:spPr>
+      </p:pic>
+    </p:spTree>
+    <p:extLst>
+      <p:ext uri="{BB962C8B-B14F-4D97-AF65-F5344CB8AC3E}">
+        <p14:creationId xmlns:p14="http://schemas.microsoft.com/office/powerpoint/2010/main" val="2401172526"/>
+      </p:ext>
+    </p:extLst>
+  </p:cSld>
+  <p:clrMapOvr>
+    <a:masterClrMapping/>
+  </p:clrMapOvr>
+</p:sld>
+</file>
+
+<file path=ppt/slides/slide5.xml><?xml version="1.0" encoding="utf-8"?>
+<p:sld xmlns:a="http://schemas.openxmlformats.org/drawingml/2006/main" xmlns:r="http://schemas.openxmlformats.org/officeDocument/2006/relationships" xmlns:p="http://schemas.openxmlformats.org/presentationml/2006/main">
+  <p:cSld>
+    <p:spTree>
+      <p:nvGrpSpPr>
+        <p:cNvPr id="1" name=""/>
+        <p:cNvGrpSpPr/>
+        <p:nvPr/>
+      </p:nvGrpSpPr>
+      <p:grpSpPr>
+        <a:xfrm>
+          <a:off x="0" y="0"/>
+          <a:ext cx="0" cy="0"/>
+          <a:chOff x="0" y="0"/>
+          <a:chExt cx="0" cy="0"/>
+        </a:xfrm>
+      </p:grpSpPr>
+      <p:sp>
+        <p:nvSpPr>
+          <p:cNvPr id="2" name="Title 1">
+            <a:extLst>
+              <a:ext uri="{FF2B5EF4-FFF2-40B4-BE49-F238E27FC236}">
+                <a16:creationId xmlns:a16="http://schemas.microsoft.com/office/drawing/2014/main" id="{D74843FB-86A5-43F5-B1CE-60F72D1D542A}"/>
+              </a:ext>
+            </a:extLst>
+          </p:cNvPr>
+          <p:cNvSpPr>
+            <a:spLocks noGrp="1"/>
+          </p:cNvSpPr>
+          <p:nvPr>
+            <p:ph type="title"/>
+          </p:nvPr>
+        </p:nvSpPr>
+        <p:spPr>
+          <a:xfrm>
+            <a:off x="-1725837" y="30517"/>
+            <a:ext cx="8229600" cy="1143000"/>
+          </a:xfrm>
+        </p:spPr>
+        <p:txBody>
+          <a:bodyPr/>
+          <a:lstStyle/>
+          <a:p>
+            <a:r>
+              <a:rPr lang="en-US" dirty="0"/>
+              <a:t>Fitting S22 </a:t>
+            </a:r>
+          </a:p>
+        </p:txBody>
+      </p:sp>
+      <p:sp>
+        <p:nvSpPr>
+          <p:cNvPr id="3" name="Content Placeholder 2">
+            <a:extLst>
+              <a:ext uri="{FF2B5EF4-FFF2-40B4-BE49-F238E27FC236}">
+                <a16:creationId xmlns:a16="http://schemas.microsoft.com/office/drawing/2014/main" id="{C28ABA1B-11EE-47D4-8CD6-533900512A73}"/>
+              </a:ext>
+            </a:extLst>
+          </p:cNvPr>
+          <p:cNvSpPr>
+            <a:spLocks noGrp="1"/>
+          </p:cNvSpPr>
+          <p:nvPr>
+            <p:ph idx="1"/>
+          </p:nvPr>
+        </p:nvSpPr>
+        <p:spPr>
+          <a:xfrm>
+            <a:off x="457200" y="1600206"/>
+            <a:ext cx="3774558" cy="4525963"/>
+          </a:xfrm>
+        </p:spPr>
+        <p:txBody>
+          <a:bodyPr>
+            <a:normAutofit/>
+          </a:bodyPr>
+          <a:lstStyle/>
+          <a:p>
+            <a:r>
+              <a:rPr lang="en-US" sz="2000" dirty="0" err="1"/>
+              <a:t>Parasitics</a:t>
+            </a:r>
+            <a:r>
+              <a:rPr lang="en-US" sz="2000" dirty="0"/>
+              <a:t> Fit By RLC Network:</a:t>
+            </a:r>
+          </a:p>
+          <a:p>
+            <a:pPr lvl="1"/>
+            <a:r>
+              <a:rPr lang="en-US" sz="1600" b="1" dirty="0" err="1"/>
+              <a:t>Ld</a:t>
+            </a:r>
+            <a:r>
+              <a:rPr lang="en-US" sz="1600" b="1" dirty="0"/>
+              <a:t> = 0.5 </a:t>
+            </a:r>
+            <a:r>
+              <a:rPr lang="en-US" sz="1600" b="1" dirty="0" err="1"/>
+              <a:t>nH</a:t>
+            </a:r>
+            <a:endParaRPr lang="en-US" sz="1600" b="1" dirty="0"/>
+          </a:p>
+          <a:p>
+            <a:pPr lvl="1"/>
+            <a:r>
+              <a:rPr lang="en-US" sz="1600" b="1" dirty="0" err="1"/>
+              <a:t>Cdg</a:t>
+            </a:r>
+            <a:r>
+              <a:rPr lang="en-US" sz="1600" b="1" dirty="0"/>
+              <a:t> = 1.26 pF</a:t>
+            </a:r>
+          </a:p>
+          <a:p>
+            <a:pPr lvl="1"/>
+            <a:r>
+              <a:rPr lang="en-US" sz="1600" b="1" dirty="0"/>
+              <a:t>Rd = 1580 Ω</a:t>
+            </a:r>
+          </a:p>
+        </p:txBody>
+      </p:sp>
+      <p:sp>
+        <p:nvSpPr>
+          <p:cNvPr id="4" name="Slide Number Placeholder 3">
+            <a:extLst>
+              <a:ext uri="{FF2B5EF4-FFF2-40B4-BE49-F238E27FC236}">
+                <a16:creationId xmlns:a16="http://schemas.microsoft.com/office/drawing/2014/main" id="{F4F5A795-C695-4AB6-A832-65547D8F01DE}"/>
+              </a:ext>
+            </a:extLst>
+          </p:cNvPr>
+          <p:cNvSpPr>
+            <a:spLocks noGrp="1"/>
+          </p:cNvSpPr>
+          <p:nvPr>
+            <p:ph type="sldNum" sz="quarter" idx="12"/>
+          </p:nvPr>
+        </p:nvSpPr>
+        <p:spPr/>
+        <p:txBody>
+          <a:bodyPr/>
+          <a:lstStyle/>
+          <a:p>
+            <a:fld id="{395A37A8-5642-4265-A9E6-C78259D0B141}" type="slidenum">
+              <a:rPr lang="en-US" smtClean="0"/>
+              <a:t>5</a:t>
+            </a:fld>
+            <a:endParaRPr lang="en-US"/>
+          </a:p>
+        </p:txBody>
+      </p:sp>
+      <p:pic>
+        <p:nvPicPr>
+          <p:cNvPr id="5" name="Picture 4">
+            <a:extLst>
+              <a:ext uri="{FF2B5EF4-FFF2-40B4-BE49-F238E27FC236}">
+                <a16:creationId xmlns:a16="http://schemas.microsoft.com/office/drawing/2014/main" id="{33964766-CC45-492E-B2C5-48CAA8685866}"/>
+              </a:ext>
+            </a:extLst>
+          </p:cNvPr>
+          <p:cNvPicPr>
+            <a:picLocks noChangeAspect="1"/>
+          </p:cNvPicPr>
+          <p:nvPr/>
+        </p:nvPicPr>
+        <p:blipFill rotWithShape="1">
+          <a:blip r:embed="rId2">
+            <a:extLst>
+              <a:ext uri="{28A0092B-C50C-407E-A947-70E740481C1C}">
+                <a14:useLocalDpi xmlns:a14="http://schemas.microsoft.com/office/drawing/2010/main" val="0"/>
+              </a:ext>
+            </a:extLst>
+          </a:blip>
+          <a:srcRect l="23792"/>
+          <a:stretch/>
+        </p:blipFill>
+        <p:spPr>
+          <a:xfrm>
+            <a:off x="2388963" y="3072809"/>
+            <a:ext cx="6671321" cy="3648672"/>
+          </a:xfrm>
+          <a:prstGeom prst="rect">
+            <a:avLst/>
+          </a:prstGeom>
+        </p:spPr>
+      </p:pic>
+      <p:pic>
+        <p:nvPicPr>
+          <p:cNvPr id="6" name="Picture 5">
+            <a:extLst>
+              <a:ext uri="{FF2B5EF4-FFF2-40B4-BE49-F238E27FC236}">
+                <a16:creationId xmlns:a16="http://schemas.microsoft.com/office/drawing/2014/main" id="{40F39D40-AF3F-4605-B704-537DBE386FDC}"/>
+              </a:ext>
+            </a:extLst>
+          </p:cNvPr>
+          <p:cNvPicPr>
+            <a:picLocks noChangeAspect="1"/>
+          </p:cNvPicPr>
+          <p:nvPr/>
+        </p:nvPicPr>
+        <p:blipFill rotWithShape="1">
+          <a:blip r:embed="rId3">
+            <a:extLst>
+              <a:ext uri="{28A0092B-C50C-407E-A947-70E740481C1C}">
+                <a14:useLocalDpi xmlns:a14="http://schemas.microsoft.com/office/drawing/2010/main" val="0"/>
+              </a:ext>
+            </a:extLst>
+          </a:blip>
+          <a:srcRect l="18246" r="3743" b="13142"/>
+          <a:stretch/>
+        </p:blipFill>
+        <p:spPr>
+          <a:xfrm>
+            <a:off x="4791050" y="32221"/>
+            <a:ext cx="4269234" cy="3419383"/>
+          </a:xfrm>
+          <a:prstGeom prst="rect">
+            <a:avLst/>
+          </a:prstGeom>
+        </p:spPr>
+      </p:pic>
+      <p:pic>
+        <p:nvPicPr>
+          <p:cNvPr id="7" name="Picture 6">
+            <a:extLst>
+              <a:ext uri="{FF2B5EF4-FFF2-40B4-BE49-F238E27FC236}">
+                <a16:creationId xmlns:a16="http://schemas.microsoft.com/office/drawing/2014/main" id="{8541C2D4-9F8C-4960-B9D2-E09258680132}"/>
+              </a:ext>
+            </a:extLst>
+          </p:cNvPr>
+          <p:cNvPicPr>
+            <a:picLocks noChangeAspect="1"/>
+          </p:cNvPicPr>
+          <p:nvPr/>
+        </p:nvPicPr>
+        <p:blipFill rotWithShape="1">
+          <a:blip r:embed="rId2">
+            <a:extLst>
+              <a:ext uri="{28A0092B-C50C-407E-A947-70E740481C1C}">
+                <a14:useLocalDpi xmlns:a14="http://schemas.microsoft.com/office/drawing/2010/main" val="0"/>
+              </a:ext>
+            </a:extLst>
+          </a:blip>
+          <a:srcRect t="6328" r="75794" b="15299"/>
+          <a:stretch/>
+        </p:blipFill>
+        <p:spPr>
+          <a:xfrm>
+            <a:off x="0" y="3519554"/>
+            <a:ext cx="2466376" cy="3338446"/>
+          </a:xfrm>
+          <a:prstGeom prst="rect">
+            <a:avLst/>
+          </a:prstGeom>
+        </p:spPr>
+      </p:pic>
+      <p:sp>
+        <p:nvSpPr>
+          <p:cNvPr id="8" name="TextBox 7">
+            <a:extLst>
+              <a:ext uri="{FF2B5EF4-FFF2-40B4-BE49-F238E27FC236}">
+                <a16:creationId xmlns:a16="http://schemas.microsoft.com/office/drawing/2014/main" id="{343538BF-C259-412F-A007-F15CBE4FBE00}"/>
+              </a:ext>
+            </a:extLst>
+          </p:cNvPr>
+          <p:cNvSpPr txBox="1"/>
+          <p:nvPr/>
+        </p:nvSpPr>
+        <p:spPr>
+          <a:xfrm>
+            <a:off x="4912244" y="6067424"/>
+            <a:ext cx="3147238" cy="646331"/>
+          </a:xfrm>
+          <a:prstGeom prst="rect">
+            <a:avLst/>
+          </a:prstGeom>
+          <a:noFill/>
+        </p:spPr>
+        <p:txBody>
+          <a:bodyPr wrap="square" rtlCol="0">
+            <a:spAutoFit/>
+          </a:bodyPr>
+          <a:lstStyle/>
+          <a:p>
+            <a:r>
+              <a:rPr lang="en-US" dirty="0">
+                <a:solidFill>
+                  <a:srgbClr val="FF0000"/>
+                </a:solidFill>
+              </a:rPr>
+              <a:t>Red – S22 of device</a:t>
+            </a:r>
+            <a:br>
+              <a:rPr lang="en-US" dirty="0">
+                <a:solidFill>
+                  <a:srgbClr val="FF0000"/>
+                </a:solidFill>
+              </a:rPr>
+            </a:br>
+            <a:r>
+              <a:rPr lang="en-US" dirty="0">
+                <a:solidFill>
+                  <a:srgbClr val="0000FF"/>
+                </a:solidFill>
+              </a:rPr>
+              <a:t>Blue – RLC Fit</a:t>
+            </a:r>
+          </a:p>
+        </p:txBody>
+      </p:sp>
+    </p:spTree>
+    <p:extLst>
+      <p:ext uri="{BB962C8B-B14F-4D97-AF65-F5344CB8AC3E}">
+        <p14:creationId xmlns:p14="http://schemas.microsoft.com/office/powerpoint/2010/main" val="2983913431"/>
+      </p:ext>
+    </p:extLst>
+  </p:cSld>
+  <p:clrMapOvr>
+    <a:masterClrMapping/>
+  </p:clrMapOvr>
+</p:sld>
+</file>
+
+<file path=ppt/slides/slide6.xml><?xml version="1.0" encoding="utf-8"?>
+<p:sld xmlns:a="http://schemas.openxmlformats.org/drawingml/2006/main" xmlns:r="http://schemas.openxmlformats.org/officeDocument/2006/relationships" xmlns:p="http://schemas.openxmlformats.org/presentationml/2006/main">
+  <p:cSld>
+    <p:spTree>
+      <p:nvGrpSpPr>
+        <p:cNvPr id="1" name=""/>
+        <p:cNvGrpSpPr/>
+        <p:nvPr/>
+      </p:nvGrpSpPr>
+      <p:grpSpPr>
+        <a:xfrm>
+          <a:off x="0" y="0"/>
+          <a:ext cx="0" cy="0"/>
+          <a:chOff x="0" y="0"/>
+          <a:chExt cx="0" cy="0"/>
+        </a:xfrm>
+      </p:grpSpPr>
+      <p:sp>
+        <p:nvSpPr>
+          <p:cNvPr id="2" name="Title 1">
+            <a:extLst>
+              <a:ext uri="{FF2B5EF4-FFF2-40B4-BE49-F238E27FC236}">
+                <a16:creationId xmlns:a16="http://schemas.microsoft.com/office/drawing/2014/main" id="{F2123C23-1C35-409E-B303-713E6BF08F50}"/>
+              </a:ext>
+            </a:extLst>
+          </p:cNvPr>
+          <p:cNvSpPr>
+            <a:spLocks noGrp="1"/>
+          </p:cNvSpPr>
+          <p:nvPr>
+            <p:ph type="title"/>
+          </p:nvPr>
+        </p:nvSpPr>
+        <p:spPr/>
+        <p:txBody>
+          <a:bodyPr/>
+          <a:lstStyle/>
+          <a:p>
+            <a:r>
+              <a:rPr lang="en-US" dirty="0"/>
+              <a:t>Plotting Cripps Contours</a:t>
+            </a:r>
+          </a:p>
+        </p:txBody>
+      </p:sp>
+      <p:sp>
+        <p:nvSpPr>
+          <p:cNvPr id="3" name="Content Placeholder 2">
+            <a:extLst>
+              <a:ext uri="{FF2B5EF4-FFF2-40B4-BE49-F238E27FC236}">
+                <a16:creationId xmlns:a16="http://schemas.microsoft.com/office/drawing/2014/main" id="{ADC41835-945F-4B6C-8C66-BCAA3DD45250}"/>
+              </a:ext>
+            </a:extLst>
+          </p:cNvPr>
+          <p:cNvSpPr>
+            <a:spLocks noGrp="1"/>
+          </p:cNvSpPr>
+          <p:nvPr>
+            <p:ph idx="1"/>
+          </p:nvPr>
+        </p:nvSpPr>
+        <p:spPr/>
+        <p:txBody>
+          <a:bodyPr>
+            <a:normAutofit/>
+          </a:bodyPr>
+          <a:lstStyle/>
+          <a:p>
+            <a:r>
+              <a:rPr lang="en-US" sz="2800" dirty="0"/>
+              <a:t>Same approach as Homework 5 was used to plot the -2 dB contours for </a:t>
+            </a:r>
+            <a:r>
+              <a:rPr lang="en-US" sz="2800" dirty="0" err="1"/>
+              <a:t>R_opt</a:t>
+            </a:r>
+            <a:r>
+              <a:rPr lang="en-US" sz="2800" dirty="0"/>
+              <a:t> = 19.28 </a:t>
+            </a:r>
+            <a:r>
+              <a:rPr lang="el-GR" sz="2800" dirty="0"/>
+              <a:t>Ω</a:t>
+            </a:r>
+            <a:r>
+              <a:rPr lang="en-US" sz="2800" dirty="0"/>
+              <a:t>, </a:t>
+            </a:r>
+            <a:r>
+              <a:rPr lang="en-US" sz="2800" dirty="0" err="1"/>
+              <a:t>Ld</a:t>
+            </a:r>
+            <a:r>
+              <a:rPr lang="en-US" sz="2800" dirty="0"/>
+              <a:t> =  0.5 </a:t>
+            </a:r>
+            <a:r>
+              <a:rPr lang="en-US" sz="2800" dirty="0" err="1"/>
+              <a:t>nH</a:t>
+            </a:r>
+            <a:r>
+              <a:rPr lang="en-US" sz="2800" dirty="0"/>
+              <a:t> and </a:t>
+            </a:r>
+            <a:r>
+              <a:rPr lang="en-US" sz="2800" dirty="0" err="1"/>
+              <a:t>Cdg</a:t>
+            </a:r>
+            <a:r>
+              <a:rPr lang="en-US" sz="2800" dirty="0"/>
+              <a:t> = 1.26 pF</a:t>
+            </a:r>
+          </a:p>
+          <a:p>
+            <a:pPr lvl="1"/>
+            <a:r>
+              <a:rPr lang="en-US" sz="2400" dirty="0"/>
+              <a:t>See contours right</a:t>
+            </a:r>
+          </a:p>
+          <a:p>
+            <a:pPr lvl="1"/>
+            <a:r>
+              <a:rPr lang="en-US" sz="2400" dirty="0"/>
+              <a:t>Z opt at extrinsic reference plane:</a:t>
+            </a:r>
+            <a:br>
+              <a:rPr lang="en-US" sz="2400" dirty="0"/>
+            </a:br>
+            <a:r>
+              <a:rPr lang="en-US" sz="2400" b="1" dirty="0"/>
+              <a:t>16.8 – j1.43 </a:t>
+            </a:r>
+          </a:p>
+          <a:p>
+            <a:pPr lvl="1"/>
+            <a:r>
+              <a:rPr lang="en-US" sz="2400" dirty="0"/>
+              <a:t>Seems to disagree slightly with </a:t>
+            </a:r>
+            <a:br>
+              <a:rPr lang="en-US" sz="2400" dirty="0"/>
+            </a:br>
+            <a:r>
+              <a:rPr lang="en-US" sz="2400" dirty="0"/>
+              <a:t>datasheet’s </a:t>
+            </a:r>
+            <a:r>
+              <a:rPr lang="en-US" sz="2400" dirty="0" err="1"/>
+              <a:t>Z_max_power</a:t>
+            </a:r>
+            <a:r>
+              <a:rPr lang="en-US" sz="2400" dirty="0"/>
+              <a:t> of</a:t>
+            </a:r>
+            <a:br>
+              <a:rPr lang="en-US" sz="2400" dirty="0"/>
+            </a:br>
+            <a:r>
+              <a:rPr lang="en-US" sz="2400" b="1" dirty="0"/>
+              <a:t>13.6 + j11.98</a:t>
+            </a:r>
+            <a:br>
+              <a:rPr lang="en-US" sz="2400" dirty="0"/>
+            </a:br>
+            <a:br>
+              <a:rPr lang="en-US" sz="2400" dirty="0"/>
+            </a:br>
+            <a:r>
+              <a:rPr lang="en-US" sz="2400" dirty="0"/>
+              <a:t>	</a:t>
+            </a:r>
+          </a:p>
+        </p:txBody>
+      </p:sp>
+      <p:sp>
+        <p:nvSpPr>
+          <p:cNvPr id="4" name="Slide Number Placeholder 3">
+            <a:extLst>
+              <a:ext uri="{FF2B5EF4-FFF2-40B4-BE49-F238E27FC236}">
+                <a16:creationId xmlns:a16="http://schemas.microsoft.com/office/drawing/2014/main" id="{2BB2DA32-1488-4459-86D7-1BB1F3DB32C6}"/>
+              </a:ext>
+            </a:extLst>
+          </p:cNvPr>
+          <p:cNvSpPr>
+            <a:spLocks noGrp="1"/>
+          </p:cNvSpPr>
+          <p:nvPr>
+            <p:ph type="sldNum" sz="quarter" idx="12"/>
+          </p:nvPr>
+        </p:nvSpPr>
+        <p:spPr/>
+        <p:txBody>
+          <a:bodyPr/>
+          <a:lstStyle/>
+          <a:p>
+            <a:fld id="{395A37A8-5642-4265-A9E6-C78259D0B141}" type="slidenum">
+              <a:rPr lang="en-US" smtClean="0"/>
+              <a:t>6</a:t>
+            </a:fld>
+            <a:endParaRPr lang="en-US"/>
+          </a:p>
+        </p:txBody>
+      </p:sp>
+      <p:sp>
+        <p:nvSpPr>
+          <p:cNvPr id="6" name="TextBox 5">
+            <a:extLst>
+              <a:ext uri="{FF2B5EF4-FFF2-40B4-BE49-F238E27FC236}">
+                <a16:creationId xmlns:a16="http://schemas.microsoft.com/office/drawing/2014/main" id="{D8DA2FB7-F13B-4C61-91F1-B45012495B65}"/>
+              </a:ext>
+            </a:extLst>
+          </p:cNvPr>
+          <p:cNvSpPr txBox="1"/>
+          <p:nvPr/>
+        </p:nvSpPr>
+        <p:spPr>
+          <a:xfrm>
+            <a:off x="5416208" y="2728378"/>
+            <a:ext cx="3138039" cy="646331"/>
+          </a:xfrm>
+          <a:prstGeom prst="rect">
+            <a:avLst/>
+          </a:prstGeom>
+          <a:noFill/>
+        </p:spPr>
+        <p:txBody>
+          <a:bodyPr wrap="none" rtlCol="0">
+            <a:spAutoFit/>
+          </a:bodyPr>
+          <a:lstStyle/>
+          <a:p>
+            <a:r>
+              <a:rPr lang="en-US" dirty="0">
+                <a:solidFill>
+                  <a:srgbClr val="FF0000"/>
+                </a:solidFill>
+              </a:rPr>
+              <a:t>Red – Extrinsic Reference Plane</a:t>
+            </a:r>
+            <a:br>
+              <a:rPr lang="en-US" dirty="0">
+                <a:solidFill>
+                  <a:srgbClr val="0000FF"/>
+                </a:solidFill>
+              </a:rPr>
+            </a:br>
+            <a:r>
+              <a:rPr lang="en-US" dirty="0">
+                <a:solidFill>
+                  <a:srgbClr val="0000FF"/>
+                </a:solidFill>
+              </a:rPr>
+              <a:t>Blue – Intrinsic Reference Plane</a:t>
+            </a:r>
+          </a:p>
+        </p:txBody>
+      </p:sp>
+      <p:pic>
+        <p:nvPicPr>
+          <p:cNvPr id="2050" name="Picture 2">
+            <a:extLst>
+              <a:ext uri="{FF2B5EF4-FFF2-40B4-BE49-F238E27FC236}">
+                <a16:creationId xmlns:a16="http://schemas.microsoft.com/office/drawing/2014/main" id="{B85D75DF-B0D6-4028-BFFC-533A54746B12}"/>
+              </a:ext>
+            </a:extLst>
+          </p:cNvPr>
+          <p:cNvPicPr>
+            <a:picLocks noChangeAspect="1" noChangeArrowheads="1"/>
+          </p:cNvPicPr>
+          <p:nvPr/>
+        </p:nvPicPr>
+        <p:blipFill>
+          <a:blip r:embed="rId2">
+            <a:extLst>
+              <a:ext uri="{28A0092B-C50C-407E-A947-70E740481C1C}">
+                <a14:useLocalDpi xmlns:a14="http://schemas.microsoft.com/office/drawing/2010/main" val="0"/>
+              </a:ext>
+            </a:extLst>
+          </a:blip>
+          <a:srcRect/>
+          <a:stretch>
+            <a:fillRect/>
+          </a:stretch>
+        </p:blipFill>
+        <p:spPr bwMode="auto">
+          <a:xfrm>
+            <a:off x="5090364" y="3219033"/>
+            <a:ext cx="3819720" cy="3819720"/>
+          </a:xfrm>
+          <a:prstGeom prst="rect">
+            <a:avLst/>
+          </a:prstGeom>
+          <a:noFill/>
+          <a:extLst>
+            <a:ext uri="{909E8E84-426E-40DD-AFC4-6F175D3DCCD1}">
+              <a14:hiddenFill xmlns:a14="http://schemas.microsoft.com/office/drawing/2010/main">
+                <a:solidFill>
+                  <a:srgbClr val="FFFFFF"/>
+                </a:solidFill>
+              </a14:hiddenFill>
+            </a:ext>
+          </a:extLst>
+        </p:spPr>
+      </p:pic>
+    </p:spTree>
+    <p:extLst>
+      <p:ext uri="{BB962C8B-B14F-4D97-AF65-F5344CB8AC3E}">
+        <p14:creationId xmlns:p14="http://schemas.microsoft.com/office/powerpoint/2010/main" val="1297791729"/>
       </p:ext>
     </p:extLst>
   </p:cSld>

</xml_diff>